<commit_message>
- updated tests and snapshots
</commit_message>
<xml_diff>
--- a/ketcher-autotests/tests/test-data/PPTX/ARROWS.pptx
+++ b/ketcher-autotests/tests/test-data/PPTX/ARROWS.pptx
@@ -285,7 +285,7 @@
           <a:p>
             <a:fld id="{297CF10A-3C75-48A1-83C4-FAAF8A4BCD76}" type="datetimeFigureOut">
               <a:rPr lang="ru-RU" smtClean="0"/>
-              <a:t>10.02.2024</a:t>
+              <a:t>20.08.2024</a:t>
             </a:fld>
             <a:endParaRPr lang="ru-RU"/>
           </a:p>
@@ -485,7 +485,7 @@
           <a:p>
             <a:fld id="{297CF10A-3C75-48A1-83C4-FAAF8A4BCD76}" type="datetimeFigureOut">
               <a:rPr lang="ru-RU" smtClean="0"/>
-              <a:t>10.02.2024</a:t>
+              <a:t>20.08.2024</a:t>
             </a:fld>
             <a:endParaRPr lang="ru-RU"/>
           </a:p>
@@ -695,7 +695,7 @@
           <a:p>
             <a:fld id="{297CF10A-3C75-48A1-83C4-FAAF8A4BCD76}" type="datetimeFigureOut">
               <a:rPr lang="ru-RU" smtClean="0"/>
-              <a:t>10.02.2024</a:t>
+              <a:t>20.08.2024</a:t>
             </a:fld>
             <a:endParaRPr lang="ru-RU"/>
           </a:p>
@@ -895,7 +895,7 @@
           <a:p>
             <a:fld id="{297CF10A-3C75-48A1-83C4-FAAF8A4BCD76}" type="datetimeFigureOut">
               <a:rPr lang="ru-RU" smtClean="0"/>
-              <a:t>10.02.2024</a:t>
+              <a:t>20.08.2024</a:t>
             </a:fld>
             <a:endParaRPr lang="ru-RU"/>
           </a:p>
@@ -1171,7 +1171,7 @@
           <a:p>
             <a:fld id="{297CF10A-3C75-48A1-83C4-FAAF8A4BCD76}" type="datetimeFigureOut">
               <a:rPr lang="ru-RU" smtClean="0"/>
-              <a:t>10.02.2024</a:t>
+              <a:t>20.08.2024</a:t>
             </a:fld>
             <a:endParaRPr lang="ru-RU"/>
           </a:p>
@@ -1439,7 +1439,7 @@
           <a:p>
             <a:fld id="{297CF10A-3C75-48A1-83C4-FAAF8A4BCD76}" type="datetimeFigureOut">
               <a:rPr lang="ru-RU" smtClean="0"/>
-              <a:t>10.02.2024</a:t>
+              <a:t>20.08.2024</a:t>
             </a:fld>
             <a:endParaRPr lang="ru-RU"/>
           </a:p>
@@ -1854,7 +1854,7 @@
           <a:p>
             <a:fld id="{297CF10A-3C75-48A1-83C4-FAAF8A4BCD76}" type="datetimeFigureOut">
               <a:rPr lang="ru-RU" smtClean="0"/>
-              <a:t>10.02.2024</a:t>
+              <a:t>20.08.2024</a:t>
             </a:fld>
             <a:endParaRPr lang="ru-RU"/>
           </a:p>
@@ -1996,7 +1996,7 @@
           <a:p>
             <a:fld id="{297CF10A-3C75-48A1-83C4-FAAF8A4BCD76}" type="datetimeFigureOut">
               <a:rPr lang="ru-RU" smtClean="0"/>
-              <a:t>10.02.2024</a:t>
+              <a:t>20.08.2024</a:t>
             </a:fld>
             <a:endParaRPr lang="ru-RU"/>
           </a:p>
@@ -2109,7 +2109,7 @@
           <a:p>
             <a:fld id="{297CF10A-3C75-48A1-83C4-FAAF8A4BCD76}" type="datetimeFigureOut">
               <a:rPr lang="ru-RU" smtClean="0"/>
-              <a:t>10.02.2024</a:t>
+              <a:t>20.08.2024</a:t>
             </a:fld>
             <a:endParaRPr lang="ru-RU"/>
           </a:p>
@@ -2422,7 +2422,7 @@
           <a:p>
             <a:fld id="{297CF10A-3C75-48A1-83C4-FAAF8A4BCD76}" type="datetimeFigureOut">
               <a:rPr lang="ru-RU" smtClean="0"/>
-              <a:t>10.02.2024</a:t>
+              <a:t>20.08.2024</a:t>
             </a:fld>
             <a:endParaRPr lang="ru-RU"/>
           </a:p>
@@ -2711,7 +2711,7 @@
           <a:p>
             <a:fld id="{297CF10A-3C75-48A1-83C4-FAAF8A4BCD76}" type="datetimeFigureOut">
               <a:rPr lang="ru-RU" smtClean="0"/>
-              <a:t>10.02.2024</a:t>
+              <a:t>20.08.2024</a:t>
             </a:fld>
             <a:endParaRPr lang="ru-RU"/>
           </a:p>
@@ -2954,7 +2954,7 @@
           <a:p>
             <a:fld id="{297CF10A-3C75-48A1-83C4-FAAF8A4BCD76}" type="datetimeFigureOut">
               <a:rPr lang="ru-RU" smtClean="0"/>
-              <a:t>10.02.2024</a:t>
+              <a:t>20.08.2024</a:t>
             </a:fld>
             <a:endParaRPr lang="ru-RU"/>
           </a:p>
@@ -3474,7 +3474,7 @@
           <p:nvPr>
             <p:extLst>
               <p:ext uri="{D42A27DB-BD31-4B8C-83A1-F6EECF244321}">
-                <p14:modId xmlns:p14="http://schemas.microsoft.com/office/powerpoint/2010/main" val="330000326"/>
+                <p14:modId xmlns:p14="http://schemas.microsoft.com/office/powerpoint/2010/main" val="537515032"/>
               </p:ext>
             </p:extLst>
           </p:nvPr>
@@ -3487,12 +3487,12 @@
           <a:graphicData uri="http://schemas.openxmlformats.org/presentationml/2006/ole">
             <mc:AlternateContent xmlns:mc="http://schemas.openxmlformats.org/markup-compatibility/2006">
               <mc:Choice xmlns:v="urn:schemas-microsoft-com:vml" Requires="v">
-                <p:oleObj name="CS ChemDraw Drawing" r:id="rId2" imgW="23327598" imgH="6188733" progId="ChemDraw.Document.6.0">
+                <p:oleObj name="CS ChemDraw Drawing" r:id="rId2" imgW="23327743" imgH="6188705" progId="ChemDraw.Document.6.0">
                   <p:embed/>
                 </p:oleObj>
               </mc:Choice>
               <mc:Fallback>
-                <p:oleObj name="CS ChemDraw Drawing" r:id="rId2" imgW="23327598" imgH="6188733" progId="ChemDraw.Document.6.0">
+                <p:oleObj name="CS ChemDraw Drawing" r:id="rId2" imgW="23327743" imgH="6188705" progId="ChemDraw.Document.6.0">
                   <p:embed/>
                   <p:pic>
                     <p:nvPicPr>
@@ -3597,7 +3597,7 @@
           <p:nvPr>
             <p:extLst>
               <p:ext uri="{D42A27DB-BD31-4B8C-83A1-F6EECF244321}">
-                <p14:modId xmlns:p14="http://schemas.microsoft.com/office/powerpoint/2010/main" val="2137396705"/>
+                <p14:modId xmlns:p14="http://schemas.microsoft.com/office/powerpoint/2010/main" val="2423740960"/>
               </p:ext>
             </p:extLst>
           </p:nvPr>
@@ -3610,12 +3610,12 @@
           <a:graphicData uri="http://schemas.openxmlformats.org/presentationml/2006/ole">
             <mc:AlternateContent xmlns:mc="http://schemas.openxmlformats.org/markup-compatibility/2006">
               <mc:Choice xmlns:v="urn:schemas-microsoft-com:vml" Requires="v">
-                <p:oleObj name="CS ChemDraw Drawing" r:id="rId2" imgW="23327292" imgH="6189957" progId="ChemDraw.Document.6.0">
+                <p:oleObj name="CS ChemDraw Drawing" r:id="rId2" imgW="23327360" imgH="6190241" progId="ChemDraw.Document.6.0">
                   <p:embed/>
                 </p:oleObj>
               </mc:Choice>
               <mc:Fallback>
-                <p:oleObj name="CS ChemDraw Drawing" r:id="rId2" imgW="23327292" imgH="6189957" progId="ChemDraw.Document.6.0">
+                <p:oleObj name="CS ChemDraw Drawing" r:id="rId2" imgW="23327360" imgH="6190241" progId="ChemDraw.Document.6.0">
                   <p:embed/>
                   <p:pic>
                     <p:nvPicPr>
@@ -3720,7 +3720,7 @@
           <p:nvPr>
             <p:extLst>
               <p:ext uri="{D42A27DB-BD31-4B8C-83A1-F6EECF244321}">
-                <p14:modId xmlns:p14="http://schemas.microsoft.com/office/powerpoint/2010/main" val="3373973084"/>
+                <p14:modId xmlns:p14="http://schemas.microsoft.com/office/powerpoint/2010/main" val="3739227208"/>
               </p:ext>
             </p:extLst>
           </p:nvPr>
@@ -3733,12 +3733,12 @@
           <a:graphicData uri="http://schemas.openxmlformats.org/presentationml/2006/ole">
             <mc:AlternateContent xmlns:mc="http://schemas.openxmlformats.org/markup-compatibility/2006">
               <mc:Choice xmlns:v="urn:schemas-microsoft-com:vml" Requires="v">
-                <p:oleObj name="CS ChemDraw Drawing" r:id="rId2" imgW="23327292" imgH="2940980" progId="ChemDraw.Document.6.0">
+                <p:oleObj name="CS ChemDraw Drawing" r:id="rId2" imgW="23327360" imgH="2941007" progId="ChemDraw.Document.6.0">
                   <p:embed/>
                 </p:oleObj>
               </mc:Choice>
               <mc:Fallback>
-                <p:oleObj name="CS ChemDraw Drawing" r:id="rId2" imgW="23327292" imgH="2940980" progId="ChemDraw.Document.6.0">
+                <p:oleObj name="CS ChemDraw Drawing" r:id="rId2" imgW="23327360" imgH="2941007" progId="ChemDraw.Document.6.0">
                   <p:embed/>
                   <p:pic>
                     <p:nvPicPr>
@@ -3843,7 +3843,7 @@
           <p:nvPr>
             <p:extLst>
               <p:ext uri="{D42A27DB-BD31-4B8C-83A1-F6EECF244321}">
-                <p14:modId xmlns:p14="http://schemas.microsoft.com/office/powerpoint/2010/main" val="3681022441"/>
+                <p14:modId xmlns:p14="http://schemas.microsoft.com/office/powerpoint/2010/main" val="580125722"/>
               </p:ext>
             </p:extLst>
           </p:nvPr>
@@ -3856,12 +3856,12 @@
           <a:graphicData uri="http://schemas.openxmlformats.org/presentationml/2006/ole">
             <mc:AlternateContent xmlns:mc="http://schemas.openxmlformats.org/markup-compatibility/2006">
               <mc:Choice xmlns:v="urn:schemas-microsoft-com:vml" Requires="v">
-                <p:oleObj name="CS ChemDraw Drawing" r:id="rId2" imgW="23327292" imgH="2940980" progId="ChemDraw.Document.6.0">
+                <p:oleObj name="CS ChemDraw Drawing" r:id="rId2" imgW="23327360" imgH="2941007" progId="ChemDraw.Document.6.0">
                   <p:embed/>
                 </p:oleObj>
               </mc:Choice>
               <mc:Fallback>
-                <p:oleObj name="CS ChemDraw Drawing" r:id="rId2" imgW="23327292" imgH="2940980" progId="ChemDraw.Document.6.0">
+                <p:oleObj name="CS ChemDraw Drawing" r:id="rId2" imgW="23327360" imgH="2941007" progId="ChemDraw.Document.6.0">
                   <p:embed/>
                   <p:pic>
                     <p:nvPicPr>
@@ -3995,25 +3995,25 @@
           <p:nvPr>
             <p:extLst>
               <p:ext uri="{D42A27DB-BD31-4B8C-83A1-F6EECF244321}">
-                <p14:modId xmlns:p14="http://schemas.microsoft.com/office/powerpoint/2010/main" val="2864544091"/>
+                <p14:modId xmlns:p14="http://schemas.microsoft.com/office/powerpoint/2010/main" val="4250645714"/>
               </p:ext>
             </p:extLst>
           </p:nvPr>
         </p:nvGraphicFramePr>
         <p:xfrm>
-          <a:off x="1164631" y="2803511"/>
-          <a:ext cx="3333750" cy="446087"/>
+          <a:off x="1165225" y="2540000"/>
+          <a:ext cx="3335338" cy="973138"/>
         </p:xfrm>
         <a:graphic>
           <a:graphicData uri="http://schemas.openxmlformats.org/presentationml/2006/ole">
             <mc:AlternateContent xmlns:mc="http://schemas.openxmlformats.org/markup-compatibility/2006">
               <mc:Choice xmlns:v="urn:schemas-microsoft-com:vml" Requires="v">
-                <p:oleObj name="CS ChemDraw Drawing" r:id="rId2" imgW="3334043" imgH="446076" progId="ChemDraw.Document.6.0">
+                <p:oleObj name="CS ChemDraw Drawing" r:id="rId2" imgW="3335547" imgH="973427" progId="ChemDraw.Document.6.0">
                   <p:embed/>
                 </p:oleObj>
               </mc:Choice>
               <mc:Fallback>
-                <p:oleObj name="CS ChemDraw Drawing" r:id="rId2" imgW="3334043" imgH="446076" progId="ChemDraw.Document.6.0">
+                <p:oleObj name="CS ChemDraw Drawing" r:id="rId2" imgW="3335547" imgH="973427" progId="ChemDraw.Document.6.0">
                   <p:embed/>
                   <p:pic>
                     <p:nvPicPr>
@@ -4029,8 +4029,8 @@
                     </p:blipFill>
                     <p:spPr>
                       <a:xfrm>
-                        <a:off x="1164631" y="2803511"/>
-                        <a:ext cx="3333750" cy="446087"/>
+                        <a:off x="1165225" y="2540000"/>
+                        <a:ext cx="3335338" cy="973138"/>
                       </a:xfrm>
                       <a:prstGeom prst="rect">
                         <a:avLst/>
@@ -4129,25 +4129,25 @@
           <p:nvPr>
             <p:extLst>
               <p:ext uri="{D42A27DB-BD31-4B8C-83A1-F6EECF244321}">
-                <p14:modId xmlns:p14="http://schemas.microsoft.com/office/powerpoint/2010/main" val="2619053422"/>
+                <p14:modId xmlns:p14="http://schemas.microsoft.com/office/powerpoint/2010/main" val="3374890392"/>
               </p:ext>
             </p:extLst>
           </p:nvPr>
         </p:nvGraphicFramePr>
         <p:xfrm>
-          <a:off x="983656" y="4939959"/>
-          <a:ext cx="3514725" cy="446087"/>
+          <a:off x="984250" y="4672013"/>
+          <a:ext cx="3516313" cy="982662"/>
         </p:xfrm>
         <a:graphic>
           <a:graphicData uri="http://schemas.openxmlformats.org/presentationml/2006/ole">
             <mc:AlternateContent xmlns:mc="http://schemas.openxmlformats.org/markup-compatibility/2006">
               <mc:Choice xmlns:v="urn:schemas-microsoft-com:vml" Requires="v">
-                <p:oleObj name="CS ChemDraw Drawing" r:id="rId4" imgW="3515394" imgH="446076" progId="ChemDraw.Document.6.0">
+                <p:oleObj name="CS ChemDraw Drawing" r:id="rId4" imgW="3516894" imgH="982639" progId="ChemDraw.Document.6.0">
                   <p:embed/>
                 </p:oleObj>
               </mc:Choice>
               <mc:Fallback>
-                <p:oleObj name="CS ChemDraw Drawing" r:id="rId4" imgW="3515394" imgH="446076" progId="ChemDraw.Document.6.0">
+                <p:oleObj name="CS ChemDraw Drawing" r:id="rId4" imgW="3516894" imgH="982639" progId="ChemDraw.Document.6.0">
                   <p:embed/>
                   <p:pic>
                     <p:nvPicPr>
@@ -4163,8 +4163,8 @@
                     </p:blipFill>
                     <p:spPr>
                       <a:xfrm>
-                        <a:off x="983656" y="4939959"/>
-                        <a:ext cx="3514725" cy="446087"/>
+                        <a:off x="984250" y="4672013"/>
+                        <a:ext cx="3516313" cy="982662"/>
                       </a:xfrm>
                       <a:prstGeom prst="rect">
                         <a:avLst/>
@@ -4222,7 +4222,7 @@
           <p:nvPr>
             <p:extLst>
               <p:ext uri="{D42A27DB-BD31-4B8C-83A1-F6EECF244321}">
-                <p14:modId xmlns:p14="http://schemas.microsoft.com/office/powerpoint/2010/main" val="4021844528"/>
+                <p14:modId xmlns:p14="http://schemas.microsoft.com/office/powerpoint/2010/main" val="570872343"/>
               </p:ext>
             </p:extLst>
           </p:nvPr>
@@ -4235,12 +4235,12 @@
           <a:graphicData uri="http://schemas.openxmlformats.org/presentationml/2006/ole">
             <mc:AlternateContent xmlns:mc="http://schemas.openxmlformats.org/markup-compatibility/2006">
               <mc:Choice xmlns:v="urn:schemas-microsoft-com:vml" Requires="v">
-                <p:oleObj name="CS ChemDraw Drawing" r:id="rId2" imgW="22793943" imgH="10457225" progId="ChemDraw.Document.6.0">
+                <p:oleObj name="CS ChemDraw Drawing" r:id="rId2" imgW="22794056" imgH="10457426" progId="ChemDraw.Document.6.0">
                   <p:embed/>
                 </p:oleObj>
               </mc:Choice>
               <mc:Fallback>
-                <p:oleObj name="CS ChemDraw Drawing" r:id="rId2" imgW="22793943" imgH="10457225" progId="ChemDraw.Document.6.0">
+                <p:oleObj name="CS ChemDraw Drawing" r:id="rId2" imgW="22794056" imgH="10457426" progId="ChemDraw.Document.6.0">
                   <p:embed/>
                   <p:pic>
                     <p:nvPicPr>
@@ -4350,7 +4350,7 @@
           <p:nvPr>
             <p:extLst>
               <p:ext uri="{D42A27DB-BD31-4B8C-83A1-F6EECF244321}">
-                <p14:modId xmlns:p14="http://schemas.microsoft.com/office/powerpoint/2010/main" val="999367555"/>
+                <p14:modId xmlns:p14="http://schemas.microsoft.com/office/powerpoint/2010/main" val="3186642112"/>
               </p:ext>
             </p:extLst>
           </p:nvPr>
@@ -4363,12 +4363,12 @@
           <a:graphicData uri="http://schemas.openxmlformats.org/presentationml/2006/ole">
             <mc:AlternateContent xmlns:mc="http://schemas.openxmlformats.org/markup-compatibility/2006">
               <mc:Choice xmlns:v="urn:schemas-microsoft-com:vml" Requires="v">
-                <p:oleObj name="CS ChemDraw Drawing" r:id="rId2" imgW="22793943" imgH="10457225" progId="ChemDraw.Document.6.0">
+                <p:oleObj name="CS ChemDraw Drawing" r:id="rId2" imgW="22794056" imgH="10457426" progId="ChemDraw.Document.6.0">
                   <p:embed/>
                 </p:oleObj>
               </mc:Choice>
               <mc:Fallback>
-                <p:oleObj name="CS ChemDraw Drawing" r:id="rId2" imgW="22793943" imgH="10457225" progId="ChemDraw.Document.6.0">
+                <p:oleObj name="CS ChemDraw Drawing" r:id="rId2" imgW="22794056" imgH="10457426" progId="ChemDraw.Document.6.0">
                   <p:embed/>
                   <p:pic>
                     <p:nvPicPr>
@@ -4479,25 +4479,25 @@
           <p:nvPr>
             <p:extLst>
               <p:ext uri="{D42A27DB-BD31-4B8C-83A1-F6EECF244321}">
-                <p14:modId xmlns:p14="http://schemas.microsoft.com/office/powerpoint/2010/main" val="79023561"/>
+                <p14:modId xmlns:p14="http://schemas.microsoft.com/office/powerpoint/2010/main" val="1870559821"/>
               </p:ext>
             </p:extLst>
           </p:nvPr>
         </p:nvGraphicFramePr>
         <p:xfrm>
           <a:off x="2032000" y="1550988"/>
-          <a:ext cx="8128000" cy="3752850"/>
+          <a:ext cx="8128000" cy="3754437"/>
         </p:xfrm>
         <a:graphic>
           <a:graphicData uri="http://schemas.openxmlformats.org/presentationml/2006/ole">
             <mc:AlternateContent xmlns:mc="http://schemas.openxmlformats.org/markup-compatibility/2006">
               <mc:Choice xmlns:v="urn:schemas-microsoft-com:vml" Requires="v">
-                <p:oleObj name="CS ChemDraw Drawing" r:id="rId2" imgW="22793943" imgH="10525805" progId="ChemDraw.Document.6.0">
+                <p:oleObj name="CS ChemDraw Drawing" r:id="rId2" imgW="22794056" imgH="10526134" progId="ChemDraw.Document.6.0">
                   <p:embed/>
                 </p:oleObj>
               </mc:Choice>
               <mc:Fallback>
-                <p:oleObj name="CS ChemDraw Drawing" r:id="rId2" imgW="22793943" imgH="10525805" progId="ChemDraw.Document.6.0">
+                <p:oleObj name="CS ChemDraw Drawing" r:id="rId2" imgW="22794056" imgH="10526134" progId="ChemDraw.Document.6.0">
                   <p:embed/>
                   <p:pic>
                     <p:nvPicPr>
@@ -4514,7 +4514,7 @@
                     <p:spPr>
                       <a:xfrm>
                         <a:off x="2032000" y="1550988"/>
-                        <a:ext cx="8128000" cy="3752850"/>
+                        <a:ext cx="8128000" cy="3754437"/>
                       </a:xfrm>
                       <a:prstGeom prst="rect">
                         <a:avLst/>
@@ -4608,25 +4608,25 @@
           <p:nvPr>
             <p:extLst>
               <p:ext uri="{D42A27DB-BD31-4B8C-83A1-F6EECF244321}">
-                <p14:modId xmlns:p14="http://schemas.microsoft.com/office/powerpoint/2010/main" val="3243855840"/>
+                <p14:modId xmlns:p14="http://schemas.microsoft.com/office/powerpoint/2010/main" val="4224478627"/>
               </p:ext>
             </p:extLst>
           </p:nvPr>
         </p:nvGraphicFramePr>
         <p:xfrm>
           <a:off x="2032000" y="1550988"/>
-          <a:ext cx="8128000" cy="3752850"/>
+          <a:ext cx="8128000" cy="3754437"/>
         </p:xfrm>
         <a:graphic>
           <a:graphicData uri="http://schemas.openxmlformats.org/presentationml/2006/ole">
             <mc:AlternateContent xmlns:mc="http://schemas.openxmlformats.org/markup-compatibility/2006">
               <mc:Choice xmlns:v="urn:schemas-microsoft-com:vml" Requires="v">
-                <p:oleObj name="CS ChemDraw Drawing" r:id="rId2" imgW="22793943" imgH="10525805" progId="ChemDraw.Document.6.0">
+                <p:oleObj name="CS ChemDraw Drawing" r:id="rId2" imgW="22794056" imgH="10526134" progId="ChemDraw.Document.6.0">
                   <p:embed/>
                 </p:oleObj>
               </mc:Choice>
               <mc:Fallback>
-                <p:oleObj name="CS ChemDraw Drawing" r:id="rId2" imgW="22793943" imgH="10525805" progId="ChemDraw.Document.6.0">
+                <p:oleObj name="CS ChemDraw Drawing" r:id="rId2" imgW="22794056" imgH="10526134" progId="ChemDraw.Document.6.0">
                   <p:embed/>
                   <p:pic>
                     <p:nvPicPr>
@@ -4643,7 +4643,7 @@
                     <p:spPr>
                       <a:xfrm>
                         <a:off x="2032000" y="1550988"/>
-                        <a:ext cx="8128000" cy="3752850"/>
+                        <a:ext cx="8128000" cy="3754437"/>
                       </a:xfrm>
                       <a:prstGeom prst="rect">
                         <a:avLst/>
@@ -4737,25 +4737,25 @@
           <p:nvPr>
             <p:extLst>
               <p:ext uri="{D42A27DB-BD31-4B8C-83A1-F6EECF244321}">
-                <p14:modId xmlns:p14="http://schemas.microsoft.com/office/powerpoint/2010/main" val="2932078159"/>
+                <p14:modId xmlns:p14="http://schemas.microsoft.com/office/powerpoint/2010/main" val="2139545604"/>
               </p:ext>
             </p:extLst>
           </p:nvPr>
         </p:nvGraphicFramePr>
         <p:xfrm>
-          <a:off x="4508500" y="685800"/>
-          <a:ext cx="3173413" cy="5484813"/>
+          <a:off x="4132263" y="685800"/>
+          <a:ext cx="3925887" cy="5484813"/>
         </p:xfrm>
         <a:graphic>
           <a:graphicData uri="http://schemas.openxmlformats.org/presentationml/2006/ole">
             <mc:AlternateContent xmlns:mc="http://schemas.openxmlformats.org/markup-compatibility/2006">
               <mc:Choice xmlns:v="urn:schemas-microsoft-com:vml" Requires="v">
-                <p:oleObj name="CS ChemDraw Drawing" r:id="rId2" imgW="3174100" imgH="5484563" progId="ChemDraw.Document.6.0">
+                <p:oleObj name="CS ChemDraw Drawing" r:id="rId2" imgW="3925594" imgH="5484737" progId="ChemDraw.Document.6.0">
                   <p:embed/>
                 </p:oleObj>
               </mc:Choice>
               <mc:Fallback>
-                <p:oleObj name="CS ChemDraw Drawing" r:id="rId2" imgW="3174100" imgH="5484563" progId="ChemDraw.Document.6.0">
+                <p:oleObj name="CS ChemDraw Drawing" r:id="rId2" imgW="3925594" imgH="5484737" progId="ChemDraw.Document.6.0">
                   <p:embed/>
                   <p:pic>
                     <p:nvPicPr>
@@ -4771,8 +4771,8 @@
                     </p:blipFill>
                     <p:spPr>
                       <a:xfrm>
-                        <a:off x="4508500" y="685800"/>
-                        <a:ext cx="3173413" cy="5484813"/>
+                        <a:off x="4132263" y="685800"/>
+                        <a:ext cx="3925887" cy="5484813"/>
                       </a:xfrm>
                       <a:prstGeom prst="rect">
                         <a:avLst/>
@@ -5046,25 +5046,25 @@
           <p:nvPr>
             <p:extLst>
               <p:ext uri="{D42A27DB-BD31-4B8C-83A1-F6EECF244321}">
-                <p14:modId xmlns:p14="http://schemas.microsoft.com/office/powerpoint/2010/main" val="1344778568"/>
+                <p14:modId xmlns:p14="http://schemas.microsoft.com/office/powerpoint/2010/main" val="668542549"/>
               </p:ext>
             </p:extLst>
           </p:nvPr>
         </p:nvGraphicFramePr>
         <p:xfrm>
-          <a:off x="2032000" y="2884488"/>
-          <a:ext cx="8128000" cy="1085850"/>
+          <a:off x="2032000" y="2881313"/>
+          <a:ext cx="8128000" cy="1093787"/>
         </p:xfrm>
         <a:graphic>
           <a:graphicData uri="http://schemas.openxmlformats.org/presentationml/2006/ole">
             <mc:AlternateContent xmlns:mc="http://schemas.openxmlformats.org/markup-compatibility/2006">
               <mc:Choice xmlns:v="urn:schemas-microsoft-com:vml" Requires="v">
-                <p:oleObj name="CS ChemDraw Drawing" r:id="rId2" imgW="23327598" imgH="3117635" progId="ChemDraw.Document.6.0">
+                <p:oleObj name="CS ChemDraw Drawing" r:id="rId2" imgW="23327743" imgH="3140606" progId="ChemDraw.Document.6.0">
                   <p:embed/>
                 </p:oleObj>
               </mc:Choice>
               <mc:Fallback>
-                <p:oleObj name="CS ChemDraw Drawing" r:id="rId2" imgW="23327598" imgH="3117635" progId="ChemDraw.Document.6.0">
+                <p:oleObj name="CS ChemDraw Drawing" r:id="rId2" imgW="23327743" imgH="3140606" progId="ChemDraw.Document.6.0">
                   <p:embed/>
                   <p:pic>
                     <p:nvPicPr>
@@ -5080,8 +5080,8 @@
                     </p:blipFill>
                     <p:spPr>
                       <a:xfrm>
-                        <a:off x="2032000" y="2884488"/>
-                        <a:ext cx="8128000" cy="1085850"/>
+                        <a:off x="2032000" y="2881313"/>
+                        <a:ext cx="8128000" cy="1093787"/>
                       </a:xfrm>
                       <a:prstGeom prst="rect">
                         <a:avLst/>
@@ -5169,7 +5169,7 @@
           <p:nvPr>
             <p:extLst>
               <p:ext uri="{D42A27DB-BD31-4B8C-83A1-F6EECF244321}">
-                <p14:modId xmlns:p14="http://schemas.microsoft.com/office/powerpoint/2010/main" val="445720960"/>
+                <p14:modId xmlns:p14="http://schemas.microsoft.com/office/powerpoint/2010/main" val="58346639"/>
               </p:ext>
             </p:extLst>
           </p:nvPr>
@@ -5182,12 +5182,12 @@
           <a:graphicData uri="http://schemas.openxmlformats.org/presentationml/2006/ole">
             <mc:AlternateContent xmlns:mc="http://schemas.openxmlformats.org/markup-compatibility/2006">
               <mc:Choice xmlns:v="urn:schemas-microsoft-com:vml" Requires="v">
-                <p:oleObj name="CS ChemDraw Drawing" r:id="rId2" imgW="23327598" imgH="2974351" progId="ChemDraw.Document.6.0">
+                <p:oleObj name="CS ChemDraw Drawing" r:id="rId2" imgW="23327743" imgH="2974785" progId="ChemDraw.Document.6.0">
                   <p:embed/>
                 </p:oleObj>
               </mc:Choice>
               <mc:Fallback>
-                <p:oleObj name="CS ChemDraw Drawing" r:id="rId2" imgW="23327598" imgH="2974351" progId="ChemDraw.Document.6.0">
+                <p:oleObj name="CS ChemDraw Drawing" r:id="rId2" imgW="23327743" imgH="2974785" progId="ChemDraw.Document.6.0">
                   <p:embed/>
                   <p:pic>
                     <p:nvPicPr>
@@ -5292,7 +5292,7 @@
           <p:nvPr>
             <p:extLst>
               <p:ext uri="{D42A27DB-BD31-4B8C-83A1-F6EECF244321}">
-                <p14:modId xmlns:p14="http://schemas.microsoft.com/office/powerpoint/2010/main" val="2590715625"/>
+                <p14:modId xmlns:p14="http://schemas.microsoft.com/office/powerpoint/2010/main" val="1981390813"/>
               </p:ext>
             </p:extLst>
           </p:nvPr>
@@ -5305,12 +5305,12 @@
           <a:graphicData uri="http://schemas.openxmlformats.org/presentationml/2006/ole">
             <mc:AlternateContent xmlns:mc="http://schemas.openxmlformats.org/markup-compatibility/2006">
               <mc:Choice xmlns:v="urn:schemas-microsoft-com:vml" Requires="v">
-                <p:oleObj name="CS ChemDraw Drawing" r:id="rId2" imgW="23327598" imgH="6204041" progId="ChemDraw.Document.6.0">
+                <p:oleObj name="CS ChemDraw Drawing" r:id="rId2" imgW="23327743" imgH="6203675" progId="ChemDraw.Document.6.0">
                   <p:embed/>
                 </p:oleObj>
               </mc:Choice>
               <mc:Fallback>
-                <p:oleObj name="CS ChemDraw Drawing" r:id="rId2" imgW="23327598" imgH="6204041" progId="ChemDraw.Document.6.0">
+                <p:oleObj name="CS ChemDraw Drawing" r:id="rId2" imgW="23327743" imgH="6203675" progId="ChemDraw.Document.6.0">
                   <p:embed/>
                   <p:pic>
                     <p:nvPicPr>

</xml_diff>

<commit_message>
- updated tests and snapshots (#5332)
</commit_message>
<xml_diff>
--- a/ketcher-autotests/tests/test-data/PPTX/ARROWS.pptx
+++ b/ketcher-autotests/tests/test-data/PPTX/ARROWS.pptx
@@ -285,7 +285,7 @@
           <a:p>
             <a:fld id="{297CF10A-3C75-48A1-83C4-FAAF8A4BCD76}" type="datetimeFigureOut">
               <a:rPr lang="ru-RU" smtClean="0"/>
-              <a:t>10.02.2024</a:t>
+              <a:t>20.08.2024</a:t>
             </a:fld>
             <a:endParaRPr lang="ru-RU"/>
           </a:p>
@@ -485,7 +485,7 @@
           <a:p>
             <a:fld id="{297CF10A-3C75-48A1-83C4-FAAF8A4BCD76}" type="datetimeFigureOut">
               <a:rPr lang="ru-RU" smtClean="0"/>
-              <a:t>10.02.2024</a:t>
+              <a:t>20.08.2024</a:t>
             </a:fld>
             <a:endParaRPr lang="ru-RU"/>
           </a:p>
@@ -695,7 +695,7 @@
           <a:p>
             <a:fld id="{297CF10A-3C75-48A1-83C4-FAAF8A4BCD76}" type="datetimeFigureOut">
               <a:rPr lang="ru-RU" smtClean="0"/>
-              <a:t>10.02.2024</a:t>
+              <a:t>20.08.2024</a:t>
             </a:fld>
             <a:endParaRPr lang="ru-RU"/>
           </a:p>
@@ -895,7 +895,7 @@
           <a:p>
             <a:fld id="{297CF10A-3C75-48A1-83C4-FAAF8A4BCD76}" type="datetimeFigureOut">
               <a:rPr lang="ru-RU" smtClean="0"/>
-              <a:t>10.02.2024</a:t>
+              <a:t>20.08.2024</a:t>
             </a:fld>
             <a:endParaRPr lang="ru-RU"/>
           </a:p>
@@ -1171,7 +1171,7 @@
           <a:p>
             <a:fld id="{297CF10A-3C75-48A1-83C4-FAAF8A4BCD76}" type="datetimeFigureOut">
               <a:rPr lang="ru-RU" smtClean="0"/>
-              <a:t>10.02.2024</a:t>
+              <a:t>20.08.2024</a:t>
             </a:fld>
             <a:endParaRPr lang="ru-RU"/>
           </a:p>
@@ -1439,7 +1439,7 @@
           <a:p>
             <a:fld id="{297CF10A-3C75-48A1-83C4-FAAF8A4BCD76}" type="datetimeFigureOut">
               <a:rPr lang="ru-RU" smtClean="0"/>
-              <a:t>10.02.2024</a:t>
+              <a:t>20.08.2024</a:t>
             </a:fld>
             <a:endParaRPr lang="ru-RU"/>
           </a:p>
@@ -1854,7 +1854,7 @@
           <a:p>
             <a:fld id="{297CF10A-3C75-48A1-83C4-FAAF8A4BCD76}" type="datetimeFigureOut">
               <a:rPr lang="ru-RU" smtClean="0"/>
-              <a:t>10.02.2024</a:t>
+              <a:t>20.08.2024</a:t>
             </a:fld>
             <a:endParaRPr lang="ru-RU"/>
           </a:p>
@@ -1996,7 +1996,7 @@
           <a:p>
             <a:fld id="{297CF10A-3C75-48A1-83C4-FAAF8A4BCD76}" type="datetimeFigureOut">
               <a:rPr lang="ru-RU" smtClean="0"/>
-              <a:t>10.02.2024</a:t>
+              <a:t>20.08.2024</a:t>
             </a:fld>
             <a:endParaRPr lang="ru-RU"/>
           </a:p>
@@ -2109,7 +2109,7 @@
           <a:p>
             <a:fld id="{297CF10A-3C75-48A1-83C4-FAAF8A4BCD76}" type="datetimeFigureOut">
               <a:rPr lang="ru-RU" smtClean="0"/>
-              <a:t>10.02.2024</a:t>
+              <a:t>20.08.2024</a:t>
             </a:fld>
             <a:endParaRPr lang="ru-RU"/>
           </a:p>
@@ -2422,7 +2422,7 @@
           <a:p>
             <a:fld id="{297CF10A-3C75-48A1-83C4-FAAF8A4BCD76}" type="datetimeFigureOut">
               <a:rPr lang="ru-RU" smtClean="0"/>
-              <a:t>10.02.2024</a:t>
+              <a:t>20.08.2024</a:t>
             </a:fld>
             <a:endParaRPr lang="ru-RU"/>
           </a:p>
@@ -2711,7 +2711,7 @@
           <a:p>
             <a:fld id="{297CF10A-3C75-48A1-83C4-FAAF8A4BCD76}" type="datetimeFigureOut">
               <a:rPr lang="ru-RU" smtClean="0"/>
-              <a:t>10.02.2024</a:t>
+              <a:t>20.08.2024</a:t>
             </a:fld>
             <a:endParaRPr lang="ru-RU"/>
           </a:p>
@@ -2954,7 +2954,7 @@
           <a:p>
             <a:fld id="{297CF10A-3C75-48A1-83C4-FAAF8A4BCD76}" type="datetimeFigureOut">
               <a:rPr lang="ru-RU" smtClean="0"/>
-              <a:t>10.02.2024</a:t>
+              <a:t>20.08.2024</a:t>
             </a:fld>
             <a:endParaRPr lang="ru-RU"/>
           </a:p>
@@ -3474,7 +3474,7 @@
           <p:nvPr>
             <p:extLst>
               <p:ext uri="{D42A27DB-BD31-4B8C-83A1-F6EECF244321}">
-                <p14:modId xmlns:p14="http://schemas.microsoft.com/office/powerpoint/2010/main" val="330000326"/>
+                <p14:modId xmlns:p14="http://schemas.microsoft.com/office/powerpoint/2010/main" val="537515032"/>
               </p:ext>
             </p:extLst>
           </p:nvPr>
@@ -3487,12 +3487,12 @@
           <a:graphicData uri="http://schemas.openxmlformats.org/presentationml/2006/ole">
             <mc:AlternateContent xmlns:mc="http://schemas.openxmlformats.org/markup-compatibility/2006">
               <mc:Choice xmlns:v="urn:schemas-microsoft-com:vml" Requires="v">
-                <p:oleObj name="CS ChemDraw Drawing" r:id="rId2" imgW="23327598" imgH="6188733" progId="ChemDraw.Document.6.0">
+                <p:oleObj name="CS ChemDraw Drawing" r:id="rId2" imgW="23327743" imgH="6188705" progId="ChemDraw.Document.6.0">
                   <p:embed/>
                 </p:oleObj>
               </mc:Choice>
               <mc:Fallback>
-                <p:oleObj name="CS ChemDraw Drawing" r:id="rId2" imgW="23327598" imgH="6188733" progId="ChemDraw.Document.6.0">
+                <p:oleObj name="CS ChemDraw Drawing" r:id="rId2" imgW="23327743" imgH="6188705" progId="ChemDraw.Document.6.0">
                   <p:embed/>
                   <p:pic>
                     <p:nvPicPr>
@@ -3597,7 +3597,7 @@
           <p:nvPr>
             <p:extLst>
               <p:ext uri="{D42A27DB-BD31-4B8C-83A1-F6EECF244321}">
-                <p14:modId xmlns:p14="http://schemas.microsoft.com/office/powerpoint/2010/main" val="2137396705"/>
+                <p14:modId xmlns:p14="http://schemas.microsoft.com/office/powerpoint/2010/main" val="2423740960"/>
               </p:ext>
             </p:extLst>
           </p:nvPr>
@@ -3610,12 +3610,12 @@
           <a:graphicData uri="http://schemas.openxmlformats.org/presentationml/2006/ole">
             <mc:AlternateContent xmlns:mc="http://schemas.openxmlformats.org/markup-compatibility/2006">
               <mc:Choice xmlns:v="urn:schemas-microsoft-com:vml" Requires="v">
-                <p:oleObj name="CS ChemDraw Drawing" r:id="rId2" imgW="23327292" imgH="6189957" progId="ChemDraw.Document.6.0">
+                <p:oleObj name="CS ChemDraw Drawing" r:id="rId2" imgW="23327360" imgH="6190241" progId="ChemDraw.Document.6.0">
                   <p:embed/>
                 </p:oleObj>
               </mc:Choice>
               <mc:Fallback>
-                <p:oleObj name="CS ChemDraw Drawing" r:id="rId2" imgW="23327292" imgH="6189957" progId="ChemDraw.Document.6.0">
+                <p:oleObj name="CS ChemDraw Drawing" r:id="rId2" imgW="23327360" imgH="6190241" progId="ChemDraw.Document.6.0">
                   <p:embed/>
                   <p:pic>
                     <p:nvPicPr>
@@ -3720,7 +3720,7 @@
           <p:nvPr>
             <p:extLst>
               <p:ext uri="{D42A27DB-BD31-4B8C-83A1-F6EECF244321}">
-                <p14:modId xmlns:p14="http://schemas.microsoft.com/office/powerpoint/2010/main" val="3373973084"/>
+                <p14:modId xmlns:p14="http://schemas.microsoft.com/office/powerpoint/2010/main" val="3739227208"/>
               </p:ext>
             </p:extLst>
           </p:nvPr>
@@ -3733,12 +3733,12 @@
           <a:graphicData uri="http://schemas.openxmlformats.org/presentationml/2006/ole">
             <mc:AlternateContent xmlns:mc="http://schemas.openxmlformats.org/markup-compatibility/2006">
               <mc:Choice xmlns:v="urn:schemas-microsoft-com:vml" Requires="v">
-                <p:oleObj name="CS ChemDraw Drawing" r:id="rId2" imgW="23327292" imgH="2940980" progId="ChemDraw.Document.6.0">
+                <p:oleObj name="CS ChemDraw Drawing" r:id="rId2" imgW="23327360" imgH="2941007" progId="ChemDraw.Document.6.0">
                   <p:embed/>
                 </p:oleObj>
               </mc:Choice>
               <mc:Fallback>
-                <p:oleObj name="CS ChemDraw Drawing" r:id="rId2" imgW="23327292" imgH="2940980" progId="ChemDraw.Document.6.0">
+                <p:oleObj name="CS ChemDraw Drawing" r:id="rId2" imgW="23327360" imgH="2941007" progId="ChemDraw.Document.6.0">
                   <p:embed/>
                   <p:pic>
                     <p:nvPicPr>
@@ -3843,7 +3843,7 @@
           <p:nvPr>
             <p:extLst>
               <p:ext uri="{D42A27DB-BD31-4B8C-83A1-F6EECF244321}">
-                <p14:modId xmlns:p14="http://schemas.microsoft.com/office/powerpoint/2010/main" val="3681022441"/>
+                <p14:modId xmlns:p14="http://schemas.microsoft.com/office/powerpoint/2010/main" val="580125722"/>
               </p:ext>
             </p:extLst>
           </p:nvPr>
@@ -3856,12 +3856,12 @@
           <a:graphicData uri="http://schemas.openxmlformats.org/presentationml/2006/ole">
             <mc:AlternateContent xmlns:mc="http://schemas.openxmlformats.org/markup-compatibility/2006">
               <mc:Choice xmlns:v="urn:schemas-microsoft-com:vml" Requires="v">
-                <p:oleObj name="CS ChemDraw Drawing" r:id="rId2" imgW="23327292" imgH="2940980" progId="ChemDraw.Document.6.0">
+                <p:oleObj name="CS ChemDraw Drawing" r:id="rId2" imgW="23327360" imgH="2941007" progId="ChemDraw.Document.6.0">
                   <p:embed/>
                 </p:oleObj>
               </mc:Choice>
               <mc:Fallback>
-                <p:oleObj name="CS ChemDraw Drawing" r:id="rId2" imgW="23327292" imgH="2940980" progId="ChemDraw.Document.6.0">
+                <p:oleObj name="CS ChemDraw Drawing" r:id="rId2" imgW="23327360" imgH="2941007" progId="ChemDraw.Document.6.0">
                   <p:embed/>
                   <p:pic>
                     <p:nvPicPr>
@@ -3995,25 +3995,25 @@
           <p:nvPr>
             <p:extLst>
               <p:ext uri="{D42A27DB-BD31-4B8C-83A1-F6EECF244321}">
-                <p14:modId xmlns:p14="http://schemas.microsoft.com/office/powerpoint/2010/main" val="2864544091"/>
+                <p14:modId xmlns:p14="http://schemas.microsoft.com/office/powerpoint/2010/main" val="4250645714"/>
               </p:ext>
             </p:extLst>
           </p:nvPr>
         </p:nvGraphicFramePr>
         <p:xfrm>
-          <a:off x="1164631" y="2803511"/>
-          <a:ext cx="3333750" cy="446087"/>
+          <a:off x="1165225" y="2540000"/>
+          <a:ext cx="3335338" cy="973138"/>
         </p:xfrm>
         <a:graphic>
           <a:graphicData uri="http://schemas.openxmlformats.org/presentationml/2006/ole">
             <mc:AlternateContent xmlns:mc="http://schemas.openxmlformats.org/markup-compatibility/2006">
               <mc:Choice xmlns:v="urn:schemas-microsoft-com:vml" Requires="v">
-                <p:oleObj name="CS ChemDraw Drawing" r:id="rId2" imgW="3334043" imgH="446076" progId="ChemDraw.Document.6.0">
+                <p:oleObj name="CS ChemDraw Drawing" r:id="rId2" imgW="3335547" imgH="973427" progId="ChemDraw.Document.6.0">
                   <p:embed/>
                 </p:oleObj>
               </mc:Choice>
               <mc:Fallback>
-                <p:oleObj name="CS ChemDraw Drawing" r:id="rId2" imgW="3334043" imgH="446076" progId="ChemDraw.Document.6.0">
+                <p:oleObj name="CS ChemDraw Drawing" r:id="rId2" imgW="3335547" imgH="973427" progId="ChemDraw.Document.6.0">
                   <p:embed/>
                   <p:pic>
                     <p:nvPicPr>
@@ -4029,8 +4029,8 @@
                     </p:blipFill>
                     <p:spPr>
                       <a:xfrm>
-                        <a:off x="1164631" y="2803511"/>
-                        <a:ext cx="3333750" cy="446087"/>
+                        <a:off x="1165225" y="2540000"/>
+                        <a:ext cx="3335338" cy="973138"/>
                       </a:xfrm>
                       <a:prstGeom prst="rect">
                         <a:avLst/>
@@ -4129,25 +4129,25 @@
           <p:nvPr>
             <p:extLst>
               <p:ext uri="{D42A27DB-BD31-4B8C-83A1-F6EECF244321}">
-                <p14:modId xmlns:p14="http://schemas.microsoft.com/office/powerpoint/2010/main" val="2619053422"/>
+                <p14:modId xmlns:p14="http://schemas.microsoft.com/office/powerpoint/2010/main" val="3374890392"/>
               </p:ext>
             </p:extLst>
           </p:nvPr>
         </p:nvGraphicFramePr>
         <p:xfrm>
-          <a:off x="983656" y="4939959"/>
-          <a:ext cx="3514725" cy="446087"/>
+          <a:off x="984250" y="4672013"/>
+          <a:ext cx="3516313" cy="982662"/>
         </p:xfrm>
         <a:graphic>
           <a:graphicData uri="http://schemas.openxmlformats.org/presentationml/2006/ole">
             <mc:AlternateContent xmlns:mc="http://schemas.openxmlformats.org/markup-compatibility/2006">
               <mc:Choice xmlns:v="urn:schemas-microsoft-com:vml" Requires="v">
-                <p:oleObj name="CS ChemDraw Drawing" r:id="rId4" imgW="3515394" imgH="446076" progId="ChemDraw.Document.6.0">
+                <p:oleObj name="CS ChemDraw Drawing" r:id="rId4" imgW="3516894" imgH="982639" progId="ChemDraw.Document.6.0">
                   <p:embed/>
                 </p:oleObj>
               </mc:Choice>
               <mc:Fallback>
-                <p:oleObj name="CS ChemDraw Drawing" r:id="rId4" imgW="3515394" imgH="446076" progId="ChemDraw.Document.6.0">
+                <p:oleObj name="CS ChemDraw Drawing" r:id="rId4" imgW="3516894" imgH="982639" progId="ChemDraw.Document.6.0">
                   <p:embed/>
                   <p:pic>
                     <p:nvPicPr>
@@ -4163,8 +4163,8 @@
                     </p:blipFill>
                     <p:spPr>
                       <a:xfrm>
-                        <a:off x="983656" y="4939959"/>
-                        <a:ext cx="3514725" cy="446087"/>
+                        <a:off x="984250" y="4672013"/>
+                        <a:ext cx="3516313" cy="982662"/>
                       </a:xfrm>
                       <a:prstGeom prst="rect">
                         <a:avLst/>
@@ -4222,7 +4222,7 @@
           <p:nvPr>
             <p:extLst>
               <p:ext uri="{D42A27DB-BD31-4B8C-83A1-F6EECF244321}">
-                <p14:modId xmlns:p14="http://schemas.microsoft.com/office/powerpoint/2010/main" val="4021844528"/>
+                <p14:modId xmlns:p14="http://schemas.microsoft.com/office/powerpoint/2010/main" val="570872343"/>
               </p:ext>
             </p:extLst>
           </p:nvPr>
@@ -4235,12 +4235,12 @@
           <a:graphicData uri="http://schemas.openxmlformats.org/presentationml/2006/ole">
             <mc:AlternateContent xmlns:mc="http://schemas.openxmlformats.org/markup-compatibility/2006">
               <mc:Choice xmlns:v="urn:schemas-microsoft-com:vml" Requires="v">
-                <p:oleObj name="CS ChemDraw Drawing" r:id="rId2" imgW="22793943" imgH="10457225" progId="ChemDraw.Document.6.0">
+                <p:oleObj name="CS ChemDraw Drawing" r:id="rId2" imgW="22794056" imgH="10457426" progId="ChemDraw.Document.6.0">
                   <p:embed/>
                 </p:oleObj>
               </mc:Choice>
               <mc:Fallback>
-                <p:oleObj name="CS ChemDraw Drawing" r:id="rId2" imgW="22793943" imgH="10457225" progId="ChemDraw.Document.6.0">
+                <p:oleObj name="CS ChemDraw Drawing" r:id="rId2" imgW="22794056" imgH="10457426" progId="ChemDraw.Document.6.0">
                   <p:embed/>
                   <p:pic>
                     <p:nvPicPr>
@@ -4350,7 +4350,7 @@
           <p:nvPr>
             <p:extLst>
               <p:ext uri="{D42A27DB-BD31-4B8C-83A1-F6EECF244321}">
-                <p14:modId xmlns:p14="http://schemas.microsoft.com/office/powerpoint/2010/main" val="999367555"/>
+                <p14:modId xmlns:p14="http://schemas.microsoft.com/office/powerpoint/2010/main" val="3186642112"/>
               </p:ext>
             </p:extLst>
           </p:nvPr>
@@ -4363,12 +4363,12 @@
           <a:graphicData uri="http://schemas.openxmlformats.org/presentationml/2006/ole">
             <mc:AlternateContent xmlns:mc="http://schemas.openxmlformats.org/markup-compatibility/2006">
               <mc:Choice xmlns:v="urn:schemas-microsoft-com:vml" Requires="v">
-                <p:oleObj name="CS ChemDraw Drawing" r:id="rId2" imgW="22793943" imgH="10457225" progId="ChemDraw.Document.6.0">
+                <p:oleObj name="CS ChemDraw Drawing" r:id="rId2" imgW="22794056" imgH="10457426" progId="ChemDraw.Document.6.0">
                   <p:embed/>
                 </p:oleObj>
               </mc:Choice>
               <mc:Fallback>
-                <p:oleObj name="CS ChemDraw Drawing" r:id="rId2" imgW="22793943" imgH="10457225" progId="ChemDraw.Document.6.0">
+                <p:oleObj name="CS ChemDraw Drawing" r:id="rId2" imgW="22794056" imgH="10457426" progId="ChemDraw.Document.6.0">
                   <p:embed/>
                   <p:pic>
                     <p:nvPicPr>
@@ -4479,25 +4479,25 @@
           <p:nvPr>
             <p:extLst>
               <p:ext uri="{D42A27DB-BD31-4B8C-83A1-F6EECF244321}">
-                <p14:modId xmlns:p14="http://schemas.microsoft.com/office/powerpoint/2010/main" val="79023561"/>
+                <p14:modId xmlns:p14="http://schemas.microsoft.com/office/powerpoint/2010/main" val="1870559821"/>
               </p:ext>
             </p:extLst>
           </p:nvPr>
         </p:nvGraphicFramePr>
         <p:xfrm>
           <a:off x="2032000" y="1550988"/>
-          <a:ext cx="8128000" cy="3752850"/>
+          <a:ext cx="8128000" cy="3754437"/>
         </p:xfrm>
         <a:graphic>
           <a:graphicData uri="http://schemas.openxmlformats.org/presentationml/2006/ole">
             <mc:AlternateContent xmlns:mc="http://schemas.openxmlformats.org/markup-compatibility/2006">
               <mc:Choice xmlns:v="urn:schemas-microsoft-com:vml" Requires="v">
-                <p:oleObj name="CS ChemDraw Drawing" r:id="rId2" imgW="22793943" imgH="10525805" progId="ChemDraw.Document.6.0">
+                <p:oleObj name="CS ChemDraw Drawing" r:id="rId2" imgW="22794056" imgH="10526134" progId="ChemDraw.Document.6.0">
                   <p:embed/>
                 </p:oleObj>
               </mc:Choice>
               <mc:Fallback>
-                <p:oleObj name="CS ChemDraw Drawing" r:id="rId2" imgW="22793943" imgH="10525805" progId="ChemDraw.Document.6.0">
+                <p:oleObj name="CS ChemDraw Drawing" r:id="rId2" imgW="22794056" imgH="10526134" progId="ChemDraw.Document.6.0">
                   <p:embed/>
                   <p:pic>
                     <p:nvPicPr>
@@ -4514,7 +4514,7 @@
                     <p:spPr>
                       <a:xfrm>
                         <a:off x="2032000" y="1550988"/>
-                        <a:ext cx="8128000" cy="3752850"/>
+                        <a:ext cx="8128000" cy="3754437"/>
                       </a:xfrm>
                       <a:prstGeom prst="rect">
                         <a:avLst/>
@@ -4608,25 +4608,25 @@
           <p:nvPr>
             <p:extLst>
               <p:ext uri="{D42A27DB-BD31-4B8C-83A1-F6EECF244321}">
-                <p14:modId xmlns:p14="http://schemas.microsoft.com/office/powerpoint/2010/main" val="3243855840"/>
+                <p14:modId xmlns:p14="http://schemas.microsoft.com/office/powerpoint/2010/main" val="4224478627"/>
               </p:ext>
             </p:extLst>
           </p:nvPr>
         </p:nvGraphicFramePr>
         <p:xfrm>
           <a:off x="2032000" y="1550988"/>
-          <a:ext cx="8128000" cy="3752850"/>
+          <a:ext cx="8128000" cy="3754437"/>
         </p:xfrm>
         <a:graphic>
           <a:graphicData uri="http://schemas.openxmlformats.org/presentationml/2006/ole">
             <mc:AlternateContent xmlns:mc="http://schemas.openxmlformats.org/markup-compatibility/2006">
               <mc:Choice xmlns:v="urn:schemas-microsoft-com:vml" Requires="v">
-                <p:oleObj name="CS ChemDraw Drawing" r:id="rId2" imgW="22793943" imgH="10525805" progId="ChemDraw.Document.6.0">
+                <p:oleObj name="CS ChemDraw Drawing" r:id="rId2" imgW="22794056" imgH="10526134" progId="ChemDraw.Document.6.0">
                   <p:embed/>
                 </p:oleObj>
               </mc:Choice>
               <mc:Fallback>
-                <p:oleObj name="CS ChemDraw Drawing" r:id="rId2" imgW="22793943" imgH="10525805" progId="ChemDraw.Document.6.0">
+                <p:oleObj name="CS ChemDraw Drawing" r:id="rId2" imgW="22794056" imgH="10526134" progId="ChemDraw.Document.6.0">
                   <p:embed/>
                   <p:pic>
                     <p:nvPicPr>
@@ -4643,7 +4643,7 @@
                     <p:spPr>
                       <a:xfrm>
                         <a:off x="2032000" y="1550988"/>
-                        <a:ext cx="8128000" cy="3752850"/>
+                        <a:ext cx="8128000" cy="3754437"/>
                       </a:xfrm>
                       <a:prstGeom prst="rect">
                         <a:avLst/>
@@ -4737,25 +4737,25 @@
           <p:nvPr>
             <p:extLst>
               <p:ext uri="{D42A27DB-BD31-4B8C-83A1-F6EECF244321}">
-                <p14:modId xmlns:p14="http://schemas.microsoft.com/office/powerpoint/2010/main" val="2932078159"/>
+                <p14:modId xmlns:p14="http://schemas.microsoft.com/office/powerpoint/2010/main" val="2139545604"/>
               </p:ext>
             </p:extLst>
           </p:nvPr>
         </p:nvGraphicFramePr>
         <p:xfrm>
-          <a:off x="4508500" y="685800"/>
-          <a:ext cx="3173413" cy="5484813"/>
+          <a:off x="4132263" y="685800"/>
+          <a:ext cx="3925887" cy="5484813"/>
         </p:xfrm>
         <a:graphic>
           <a:graphicData uri="http://schemas.openxmlformats.org/presentationml/2006/ole">
             <mc:AlternateContent xmlns:mc="http://schemas.openxmlformats.org/markup-compatibility/2006">
               <mc:Choice xmlns:v="urn:schemas-microsoft-com:vml" Requires="v">
-                <p:oleObj name="CS ChemDraw Drawing" r:id="rId2" imgW="3174100" imgH="5484563" progId="ChemDraw.Document.6.0">
+                <p:oleObj name="CS ChemDraw Drawing" r:id="rId2" imgW="3925594" imgH="5484737" progId="ChemDraw.Document.6.0">
                   <p:embed/>
                 </p:oleObj>
               </mc:Choice>
               <mc:Fallback>
-                <p:oleObj name="CS ChemDraw Drawing" r:id="rId2" imgW="3174100" imgH="5484563" progId="ChemDraw.Document.6.0">
+                <p:oleObj name="CS ChemDraw Drawing" r:id="rId2" imgW="3925594" imgH="5484737" progId="ChemDraw.Document.6.0">
                   <p:embed/>
                   <p:pic>
                     <p:nvPicPr>
@@ -4771,8 +4771,8 @@
                     </p:blipFill>
                     <p:spPr>
                       <a:xfrm>
-                        <a:off x="4508500" y="685800"/>
-                        <a:ext cx="3173413" cy="5484813"/>
+                        <a:off x="4132263" y="685800"/>
+                        <a:ext cx="3925887" cy="5484813"/>
                       </a:xfrm>
                       <a:prstGeom prst="rect">
                         <a:avLst/>
@@ -5046,25 +5046,25 @@
           <p:nvPr>
             <p:extLst>
               <p:ext uri="{D42A27DB-BD31-4B8C-83A1-F6EECF244321}">
-                <p14:modId xmlns:p14="http://schemas.microsoft.com/office/powerpoint/2010/main" val="1344778568"/>
+                <p14:modId xmlns:p14="http://schemas.microsoft.com/office/powerpoint/2010/main" val="668542549"/>
               </p:ext>
             </p:extLst>
           </p:nvPr>
         </p:nvGraphicFramePr>
         <p:xfrm>
-          <a:off x="2032000" y="2884488"/>
-          <a:ext cx="8128000" cy="1085850"/>
+          <a:off x="2032000" y="2881313"/>
+          <a:ext cx="8128000" cy="1093787"/>
         </p:xfrm>
         <a:graphic>
           <a:graphicData uri="http://schemas.openxmlformats.org/presentationml/2006/ole">
             <mc:AlternateContent xmlns:mc="http://schemas.openxmlformats.org/markup-compatibility/2006">
               <mc:Choice xmlns:v="urn:schemas-microsoft-com:vml" Requires="v">
-                <p:oleObj name="CS ChemDraw Drawing" r:id="rId2" imgW="23327598" imgH="3117635" progId="ChemDraw.Document.6.0">
+                <p:oleObj name="CS ChemDraw Drawing" r:id="rId2" imgW="23327743" imgH="3140606" progId="ChemDraw.Document.6.0">
                   <p:embed/>
                 </p:oleObj>
               </mc:Choice>
               <mc:Fallback>
-                <p:oleObj name="CS ChemDraw Drawing" r:id="rId2" imgW="23327598" imgH="3117635" progId="ChemDraw.Document.6.0">
+                <p:oleObj name="CS ChemDraw Drawing" r:id="rId2" imgW="23327743" imgH="3140606" progId="ChemDraw.Document.6.0">
                   <p:embed/>
                   <p:pic>
                     <p:nvPicPr>
@@ -5080,8 +5080,8 @@
                     </p:blipFill>
                     <p:spPr>
                       <a:xfrm>
-                        <a:off x="2032000" y="2884488"/>
-                        <a:ext cx="8128000" cy="1085850"/>
+                        <a:off x="2032000" y="2881313"/>
+                        <a:ext cx="8128000" cy="1093787"/>
                       </a:xfrm>
                       <a:prstGeom prst="rect">
                         <a:avLst/>
@@ -5169,7 +5169,7 @@
           <p:nvPr>
             <p:extLst>
               <p:ext uri="{D42A27DB-BD31-4B8C-83A1-F6EECF244321}">
-                <p14:modId xmlns:p14="http://schemas.microsoft.com/office/powerpoint/2010/main" val="445720960"/>
+                <p14:modId xmlns:p14="http://schemas.microsoft.com/office/powerpoint/2010/main" val="58346639"/>
               </p:ext>
             </p:extLst>
           </p:nvPr>
@@ -5182,12 +5182,12 @@
           <a:graphicData uri="http://schemas.openxmlformats.org/presentationml/2006/ole">
             <mc:AlternateContent xmlns:mc="http://schemas.openxmlformats.org/markup-compatibility/2006">
               <mc:Choice xmlns:v="urn:schemas-microsoft-com:vml" Requires="v">
-                <p:oleObj name="CS ChemDraw Drawing" r:id="rId2" imgW="23327598" imgH="2974351" progId="ChemDraw.Document.6.0">
+                <p:oleObj name="CS ChemDraw Drawing" r:id="rId2" imgW="23327743" imgH="2974785" progId="ChemDraw.Document.6.0">
                   <p:embed/>
                 </p:oleObj>
               </mc:Choice>
               <mc:Fallback>
-                <p:oleObj name="CS ChemDraw Drawing" r:id="rId2" imgW="23327598" imgH="2974351" progId="ChemDraw.Document.6.0">
+                <p:oleObj name="CS ChemDraw Drawing" r:id="rId2" imgW="23327743" imgH="2974785" progId="ChemDraw.Document.6.0">
                   <p:embed/>
                   <p:pic>
                     <p:nvPicPr>
@@ -5292,7 +5292,7 @@
           <p:nvPr>
             <p:extLst>
               <p:ext uri="{D42A27DB-BD31-4B8C-83A1-F6EECF244321}">
-                <p14:modId xmlns:p14="http://schemas.microsoft.com/office/powerpoint/2010/main" val="2590715625"/>
+                <p14:modId xmlns:p14="http://schemas.microsoft.com/office/powerpoint/2010/main" val="1981390813"/>
               </p:ext>
             </p:extLst>
           </p:nvPr>
@@ -5305,12 +5305,12 @@
           <a:graphicData uri="http://schemas.openxmlformats.org/presentationml/2006/ole">
             <mc:AlternateContent xmlns:mc="http://schemas.openxmlformats.org/markup-compatibility/2006">
               <mc:Choice xmlns:v="urn:schemas-microsoft-com:vml" Requires="v">
-                <p:oleObj name="CS ChemDraw Drawing" r:id="rId2" imgW="23327598" imgH="6204041" progId="ChemDraw.Document.6.0">
+                <p:oleObj name="CS ChemDraw Drawing" r:id="rId2" imgW="23327743" imgH="6203675" progId="ChemDraw.Document.6.0">
                   <p:embed/>
                 </p:oleObj>
               </mc:Choice>
               <mc:Fallback>
-                <p:oleObj name="CS ChemDraw Drawing" r:id="rId2" imgW="23327598" imgH="6204041" progId="ChemDraw.Document.6.0">
+                <p:oleObj name="CS ChemDraw Drawing" r:id="rId2" imgW="23327743" imgH="6203675" progId="ChemDraw.Document.6.0">
                   <p:embed/>
                   <p:pic>
                     <p:nvPicPr>

</xml_diff>